<commit_message>
# add a warning message
</commit_message>
<xml_diff>
--- a/PTEBAR-JUV/Scripts_orga.pptx
+++ b/PTEBAR-JUV/Scripts_orga.pptx
@@ -104,6 +104,11 @@
       </a:defRPr>
     </a:lvl9pPr>
   </p:defaultTextStyle>
+  <p:extLst>
+    <p:ext uri="{EFAFB233-063F-42B5-8137-9DF3F51BA10A}">
+      <p15:sldGuideLst xmlns:p15="http://schemas.microsoft.com/office/powerpoint/2012/main"/>
+    </p:ext>
+  </p:extLst>
 </p:presentation>
 </file>
 
@@ -256,7 +261,7 @@
           <a:p>
             <a:fld id="{0673F054-1BB9-4748-8CD5-AE62ED6605DD}" type="datetimeFigureOut">
               <a:rPr lang="en-CA" smtClean="0"/>
-              <a:t>2021-11-23</a:t>
+              <a:t>2021-11-24</a:t>
             </a:fld>
             <a:endParaRPr lang="en-CA"/>
           </a:p>
@@ -456,7 +461,7 @@
           <a:p>
             <a:fld id="{0673F054-1BB9-4748-8CD5-AE62ED6605DD}" type="datetimeFigureOut">
               <a:rPr lang="en-CA" smtClean="0"/>
-              <a:t>2021-11-23</a:t>
+              <a:t>2021-11-24</a:t>
             </a:fld>
             <a:endParaRPr lang="en-CA"/>
           </a:p>
@@ -666,7 +671,7 @@
           <a:p>
             <a:fld id="{0673F054-1BB9-4748-8CD5-AE62ED6605DD}" type="datetimeFigureOut">
               <a:rPr lang="en-CA" smtClean="0"/>
-              <a:t>2021-11-23</a:t>
+              <a:t>2021-11-24</a:t>
             </a:fld>
             <a:endParaRPr lang="en-CA"/>
           </a:p>
@@ -866,7 +871,7 @@
           <a:p>
             <a:fld id="{0673F054-1BB9-4748-8CD5-AE62ED6605DD}" type="datetimeFigureOut">
               <a:rPr lang="en-CA" smtClean="0"/>
-              <a:t>2021-11-23</a:t>
+              <a:t>2021-11-24</a:t>
             </a:fld>
             <a:endParaRPr lang="en-CA"/>
           </a:p>
@@ -1142,7 +1147,7 @@
           <a:p>
             <a:fld id="{0673F054-1BB9-4748-8CD5-AE62ED6605DD}" type="datetimeFigureOut">
               <a:rPr lang="en-CA" smtClean="0"/>
-              <a:t>2021-11-23</a:t>
+              <a:t>2021-11-24</a:t>
             </a:fld>
             <a:endParaRPr lang="en-CA"/>
           </a:p>
@@ -1410,7 +1415,7 @@
           <a:p>
             <a:fld id="{0673F054-1BB9-4748-8CD5-AE62ED6605DD}" type="datetimeFigureOut">
               <a:rPr lang="en-CA" smtClean="0"/>
-              <a:t>2021-11-23</a:t>
+              <a:t>2021-11-24</a:t>
             </a:fld>
             <a:endParaRPr lang="en-CA"/>
           </a:p>
@@ -1825,7 +1830,7 @@
           <a:p>
             <a:fld id="{0673F054-1BB9-4748-8CD5-AE62ED6605DD}" type="datetimeFigureOut">
               <a:rPr lang="en-CA" smtClean="0"/>
-              <a:t>2021-11-23</a:t>
+              <a:t>2021-11-24</a:t>
             </a:fld>
             <a:endParaRPr lang="en-CA"/>
           </a:p>
@@ -1967,7 +1972,7 @@
           <a:p>
             <a:fld id="{0673F054-1BB9-4748-8CD5-AE62ED6605DD}" type="datetimeFigureOut">
               <a:rPr lang="en-CA" smtClean="0"/>
-              <a:t>2021-11-23</a:t>
+              <a:t>2021-11-24</a:t>
             </a:fld>
             <a:endParaRPr lang="en-CA"/>
           </a:p>
@@ -2080,7 +2085,7 @@
           <a:p>
             <a:fld id="{0673F054-1BB9-4748-8CD5-AE62ED6605DD}" type="datetimeFigureOut">
               <a:rPr lang="en-CA" smtClean="0"/>
-              <a:t>2021-11-23</a:t>
+              <a:t>2021-11-24</a:t>
             </a:fld>
             <a:endParaRPr lang="en-CA"/>
           </a:p>
@@ -2393,7 +2398,7 @@
           <a:p>
             <a:fld id="{0673F054-1BB9-4748-8CD5-AE62ED6605DD}" type="datetimeFigureOut">
               <a:rPr lang="en-CA" smtClean="0"/>
-              <a:t>2021-11-23</a:t>
+              <a:t>2021-11-24</a:t>
             </a:fld>
             <a:endParaRPr lang="en-CA"/>
           </a:p>
@@ -2682,7 +2687,7 @@
           <a:p>
             <a:fld id="{0673F054-1BB9-4748-8CD5-AE62ED6605DD}" type="datetimeFigureOut">
               <a:rPr lang="en-CA" smtClean="0"/>
-              <a:t>2021-11-23</a:t>
+              <a:t>2021-11-24</a:t>
             </a:fld>
             <a:endParaRPr lang="en-CA"/>
           </a:p>
@@ -2925,7 +2930,7 @@
           <a:p>
             <a:fld id="{0673F054-1BB9-4748-8CD5-AE62ED6605DD}" type="datetimeFigureOut">
               <a:rPr lang="en-CA" smtClean="0"/>
-              <a:t>2021-11-23</a:t>
+              <a:t>2021-11-24</a:t>
             </a:fld>
             <a:endParaRPr lang="en-CA"/>
           </a:p>
@@ -5507,6 +5512,111 @@
           </a:fontRef>
         </p:style>
       </p:cxnSp>
+      <p:sp>
+        <p:nvSpPr>
+          <p:cNvPr id="2" name="ZoneTexte 1">
+            <a:extLst>
+              <a:ext uri="{FF2B5EF4-FFF2-40B4-BE49-F238E27FC236}">
+                <a16:creationId xmlns:a16="http://schemas.microsoft.com/office/drawing/2014/main" id="{C8219CCC-32AF-476A-A2EA-F8863DC6A9F9}"/>
+              </a:ext>
+            </a:extLst>
+          </p:cNvPr>
+          <p:cNvSpPr txBox="1"/>
+          <p:nvPr/>
+        </p:nvSpPr>
+        <p:spPr>
+          <a:xfrm>
+            <a:off x="2249940" y="3260551"/>
+            <a:ext cx="1488798" cy="646331"/>
+          </a:xfrm>
+          <a:prstGeom prst="rect">
+            <a:avLst/>
+          </a:prstGeom>
+          <a:noFill/>
+          <a:ln>
+            <a:solidFill>
+              <a:srgbClr val="FF0000"/>
+            </a:solidFill>
+          </a:ln>
+        </p:spPr>
+        <p:txBody>
+          <a:bodyPr wrap="square" rtlCol="0">
+            <a:spAutoFit/>
+          </a:bodyPr>
+          <a:lstStyle/>
+          <a:p>
+            <a:r>
+              <a:rPr lang="fr-FR" sz="1200" dirty="0">
+                <a:solidFill>
+                  <a:srgbClr val="FF0000"/>
+                </a:solidFill>
+              </a:rPr>
+              <a:t>! </a:t>
+            </a:r>
+            <a:r>
+              <a:rPr lang="fr-FR" sz="1200" dirty="0" err="1">
+                <a:solidFill>
+                  <a:srgbClr val="FF0000"/>
+                </a:solidFill>
+              </a:rPr>
+              <a:t>Modif</a:t>
+            </a:r>
+            <a:r>
+              <a:rPr lang="fr-FR" sz="1200" dirty="0">
+                <a:solidFill>
+                  <a:srgbClr val="FF0000"/>
+                </a:solidFill>
+              </a:rPr>
+              <a:t> du .</a:t>
+            </a:r>
+            <a:r>
+              <a:rPr lang="fr-FR" sz="1200" dirty="0" err="1">
+                <a:solidFill>
+                  <a:srgbClr val="FF0000"/>
+                </a:solidFill>
+              </a:rPr>
+              <a:t>rds</a:t>
+            </a:r>
+            <a:r>
+              <a:rPr lang="fr-FR" sz="1200" dirty="0">
+                <a:solidFill>
+                  <a:srgbClr val="FF0000"/>
+                </a:solidFill>
+              </a:rPr>
+              <a:t> avec ajout colonne et class </a:t>
+            </a:r>
+            <a:r>
+              <a:rPr lang="fr-FR" sz="1200" dirty="0" err="1">
+                <a:solidFill>
+                  <a:srgbClr val="FF0000"/>
+                </a:solidFill>
+              </a:rPr>
+              <a:t>sf</a:t>
+            </a:r>
+            <a:r>
+              <a:rPr lang="fr-FR" sz="1200" dirty="0">
+                <a:solidFill>
+                  <a:srgbClr val="FF0000"/>
+                </a:solidFill>
+              </a:rPr>
+              <a:t> le 24 </a:t>
+            </a:r>
+            <a:r>
+              <a:rPr lang="fr-FR" sz="1200" dirty="0" err="1">
+                <a:solidFill>
+                  <a:srgbClr val="FF0000"/>
+                </a:solidFill>
+              </a:rPr>
+              <a:t>nov</a:t>
+            </a:r>
+            <a:endParaRPr lang="en-CA" sz="1200" dirty="0">
+              <a:solidFill>
+                <a:srgbClr val="FF0000"/>
+              </a:solidFill>
+            </a:endParaRPr>
+          </a:p>
+        </p:txBody>
+      </p:sp>
     </p:spTree>
     <p:extLst>
       <p:ext uri="{BB962C8B-B14F-4D97-AF65-F5344CB8AC3E}">

</xml_diff>